<commit_message>
VERSION 2.0 Presentation update
</commit_message>
<xml_diff>
--- a/КОСМИК.pptx
+++ b/КОСМИК.pptx
@@ -9,6 +9,8 @@
     <p:sldId id="257" r:id="rId21"/>
     <p:sldId id="258" r:id="rId22"/>
     <p:sldId id="259" r:id="rId23"/>
+    <p:sldId id="260" r:id="rId24"/>
+    <p:sldId id="261" r:id="rId25"/>
   </p:sldIdLst>
   <p:sldSz cx="18288000" cy="10287000"/>
   <p:notesSz cx="6858000" cy="9144000"/>
@@ -5152,6 +5154,914 @@
 </file>
 
 <file path=ppt/slides/slide3.xml><?xml version="1.0" encoding="utf-8"?>
+<p:sld xmlns:p="http://schemas.openxmlformats.org/presentationml/2006/main" xmlns:a="http://schemas.openxmlformats.org/drawingml/2006/main" xmlns:r="http://schemas.openxmlformats.org/officeDocument/2006/relationships">
+  <p:cSld>
+    <p:bg>
+      <p:bgPr>
+        <a:solidFill>
+          <a:srgbClr val="FAFAFA"/>
+        </a:solidFill>
+      </p:bgPr>
+    </p:bg>
+    <p:spTree>
+      <p:nvGrpSpPr>
+        <p:cNvPr id="1" name=""/>
+        <p:cNvGrpSpPr/>
+        <p:nvPr/>
+      </p:nvGrpSpPr>
+      <p:grpSpPr>
+        <a:xfrm>
+          <a:off x="0" y="0"/>
+          <a:ext cx="0" cy="0"/>
+          <a:chOff x="0" y="0"/>
+          <a:chExt cx="0" cy="0"/>
+        </a:xfrm>
+      </p:grpSpPr>
+      <p:grpSp>
+        <p:nvGrpSpPr>
+          <p:cNvPr name="Group 2" id="2"/>
+          <p:cNvGrpSpPr/>
+          <p:nvPr/>
+        </p:nvGrpSpPr>
+        <p:grpSpPr>
+          <a:xfrm rot="0">
+            <a:off x="11619592" y="-2679621"/>
+            <a:ext cx="5359242" cy="5359242"/>
+            <a:chOff x="0" y="0"/>
+            <a:chExt cx="6350000" cy="6350000"/>
+          </a:xfrm>
+        </p:grpSpPr>
+        <p:sp>
+          <p:nvSpPr>
+            <p:cNvPr name="Freeform 3" id="3"/>
+            <p:cNvSpPr/>
+            <p:nvPr/>
+          </p:nvSpPr>
+          <p:spPr>
+            <a:xfrm>
+              <a:off x="14167" y="0"/>
+              <a:ext cx="6321665" cy="6350000"/>
+            </a:xfrm>
+            <a:custGeom>
+              <a:avLst/>
+              <a:gdLst/>
+              <a:ahLst/>
+              <a:cxnLst/>
+              <a:rect r="r" b="b" t="t" l="l"/>
+              <a:pathLst>
+                <a:path h="6350000" w="6321665">
+                  <a:moveTo>
+                    <a:pt x="3160833" y="0"/>
+                  </a:moveTo>
+                  <a:lnTo>
+                    <a:pt x="3160833" y="0"/>
+                  </a:lnTo>
+                  <a:cubicBezTo>
+                    <a:pt x="4908795" y="7817"/>
+                    <a:pt x="6321666" y="1427021"/>
+                    <a:pt x="6321666" y="3175000"/>
+                  </a:cubicBezTo>
+                  <a:cubicBezTo>
+                    <a:pt x="6321666" y="4922979"/>
+                    <a:pt x="4908795" y="6342183"/>
+                    <a:pt x="3160833" y="6350000"/>
+                  </a:cubicBezTo>
+                  <a:cubicBezTo>
+                    <a:pt x="1412871" y="6342183"/>
+                    <a:pt x="0" y="4922979"/>
+                    <a:pt x="0" y="3175000"/>
+                  </a:cubicBezTo>
+                  <a:cubicBezTo>
+                    <a:pt x="0" y="1427021"/>
+                    <a:pt x="1412871" y="7817"/>
+                    <a:pt x="3160833" y="0"/>
+                  </a:cubicBezTo>
+                  <a:close/>
+                </a:path>
+              </a:pathLst>
+            </a:custGeom>
+            <a:solidFill>
+              <a:srgbClr val="2ED47B"/>
+            </a:solidFill>
+          </p:spPr>
+        </p:sp>
+      </p:grpSp>
+      <p:grpSp>
+        <p:nvGrpSpPr>
+          <p:cNvPr name="Group 4" id="4"/>
+          <p:cNvGrpSpPr/>
+          <p:nvPr/>
+        </p:nvGrpSpPr>
+        <p:grpSpPr>
+          <a:xfrm rot="0">
+            <a:off x="14346723" y="1450399"/>
+            <a:ext cx="2912577" cy="3853697"/>
+            <a:chOff x="0" y="0"/>
+            <a:chExt cx="4589780" cy="4578350"/>
+          </a:xfrm>
+        </p:grpSpPr>
+        <p:sp>
+          <p:nvSpPr>
+            <p:cNvPr name="Freeform 5" id="5"/>
+            <p:cNvSpPr/>
+            <p:nvPr/>
+          </p:nvSpPr>
+          <p:spPr>
+            <a:xfrm>
+              <a:off x="232345" y="284969"/>
+              <a:ext cx="2418937" cy="3183210"/>
+            </a:xfrm>
+            <a:custGeom>
+              <a:avLst/>
+              <a:gdLst/>
+              <a:ahLst/>
+              <a:cxnLst/>
+              <a:rect r="r" b="b" t="t" l="l"/>
+              <a:pathLst>
+                <a:path h="3183210" w="2418937">
+                  <a:moveTo>
+                    <a:pt x="20688" y="189979"/>
+                  </a:moveTo>
+                  <a:lnTo>
+                    <a:pt x="20688" y="158316"/>
+                  </a:lnTo>
+                  <a:cubicBezTo>
+                    <a:pt x="46947" y="158316"/>
+                    <a:pt x="68431" y="129819"/>
+                    <a:pt x="68431" y="94990"/>
+                  </a:cubicBezTo>
+                  <a:cubicBezTo>
+                    <a:pt x="68431" y="60160"/>
+                    <a:pt x="46947" y="31663"/>
+                    <a:pt x="20688" y="31663"/>
+                  </a:cubicBezTo>
+                  <a:lnTo>
+                    <a:pt x="20688" y="0"/>
+                  </a:lnTo>
+                  <a:cubicBezTo>
+                    <a:pt x="60474" y="0"/>
+                    <a:pt x="92302" y="42218"/>
+                    <a:pt x="92302" y="94990"/>
+                  </a:cubicBezTo>
+                  <a:cubicBezTo>
+                    <a:pt x="92302" y="147762"/>
+                    <a:pt x="60474" y="189979"/>
+                    <a:pt x="20688" y="189979"/>
+                  </a:cubicBezTo>
+                  <a:close/>
+                  <a:moveTo>
+                    <a:pt x="1273125" y="109766"/>
+                  </a:moveTo>
+                  <a:lnTo>
+                    <a:pt x="1273125" y="78103"/>
+                  </a:lnTo>
+                  <a:lnTo>
+                    <a:pt x="1129898" y="78103"/>
+                  </a:lnTo>
+                  <a:lnTo>
+                    <a:pt x="1129898" y="109766"/>
+                  </a:lnTo>
+                  <a:lnTo>
+                    <a:pt x="1273125" y="109766"/>
+                  </a:lnTo>
+                  <a:close/>
+                  <a:moveTo>
+                    <a:pt x="1201511" y="3183210"/>
+                  </a:moveTo>
+                  <a:cubicBezTo>
+                    <a:pt x="1241297" y="3183210"/>
+                    <a:pt x="1273125" y="3140992"/>
+                    <a:pt x="1273125" y="3088220"/>
+                  </a:cubicBezTo>
+                  <a:lnTo>
+                    <a:pt x="1249254" y="3088220"/>
+                  </a:lnTo>
+                  <a:cubicBezTo>
+                    <a:pt x="1249254" y="3123049"/>
+                    <a:pt x="1227770" y="3151546"/>
+                    <a:pt x="1201511" y="3151546"/>
+                  </a:cubicBezTo>
+                  <a:cubicBezTo>
+                    <a:pt x="1175253" y="3151546"/>
+                    <a:pt x="1153769" y="3123049"/>
+                    <a:pt x="1153769" y="3088220"/>
+                  </a:cubicBezTo>
+                  <a:lnTo>
+                    <a:pt x="1129898" y="3088220"/>
+                  </a:lnTo>
+                  <a:cubicBezTo>
+                    <a:pt x="1129898" y="3139936"/>
+                    <a:pt x="1161726" y="3183210"/>
+                    <a:pt x="1201511" y="3183210"/>
+                  </a:cubicBezTo>
+                  <a:close/>
+                  <a:moveTo>
+                    <a:pt x="592799" y="2373686"/>
+                  </a:moveTo>
+                  <a:cubicBezTo>
+                    <a:pt x="592799" y="2426458"/>
+                    <a:pt x="624627" y="2468676"/>
+                    <a:pt x="664412" y="2468676"/>
+                  </a:cubicBezTo>
+                  <a:lnTo>
+                    <a:pt x="664412" y="2437013"/>
+                  </a:lnTo>
+                  <a:cubicBezTo>
+                    <a:pt x="638154" y="2437013"/>
+                    <a:pt x="616670" y="2408516"/>
+                    <a:pt x="616670" y="2373686"/>
+                  </a:cubicBezTo>
+                  <a:cubicBezTo>
+                    <a:pt x="616670" y="2338857"/>
+                    <a:pt x="638154" y="2310360"/>
+                    <a:pt x="664412" y="2310360"/>
+                  </a:cubicBezTo>
+                  <a:lnTo>
+                    <a:pt x="664412" y="2278697"/>
+                  </a:lnTo>
+                  <a:cubicBezTo>
+                    <a:pt x="625423" y="2278697"/>
+                    <a:pt x="592799" y="2321970"/>
+                    <a:pt x="592799" y="2373686"/>
+                  </a:cubicBezTo>
+                  <a:close/>
+                  <a:moveTo>
+                    <a:pt x="101054" y="1690816"/>
+                  </a:moveTo>
+                  <a:lnTo>
+                    <a:pt x="117764" y="1667597"/>
+                  </a:lnTo>
+                  <a:lnTo>
+                    <a:pt x="16710" y="1533555"/>
+                  </a:lnTo>
+                  <a:lnTo>
+                    <a:pt x="0" y="1555720"/>
+                  </a:lnTo>
+                  <a:lnTo>
+                    <a:pt x="101054" y="1690816"/>
+                  </a:lnTo>
+                  <a:close/>
+                  <a:moveTo>
+                    <a:pt x="2418937" y="874960"/>
+                  </a:moveTo>
+                  <a:lnTo>
+                    <a:pt x="2418937" y="843297"/>
+                  </a:lnTo>
+                  <a:lnTo>
+                    <a:pt x="2275710" y="843297"/>
+                  </a:lnTo>
+                  <a:lnTo>
+                    <a:pt x="2275710" y="874960"/>
+                  </a:lnTo>
+                  <a:lnTo>
+                    <a:pt x="2418937" y="874960"/>
+                  </a:lnTo>
+                  <a:close/>
+                  <a:moveTo>
+                    <a:pt x="2311517" y="1617991"/>
+                  </a:moveTo>
+                  <a:cubicBezTo>
+                    <a:pt x="2311517" y="1670763"/>
+                    <a:pt x="2343345" y="1712981"/>
+                    <a:pt x="2383130" y="1712981"/>
+                  </a:cubicBezTo>
+                  <a:lnTo>
+                    <a:pt x="2383130" y="1681317"/>
+                  </a:lnTo>
+                  <a:cubicBezTo>
+                    <a:pt x="2356872" y="1681317"/>
+                    <a:pt x="2335388" y="1652820"/>
+                    <a:pt x="2335388" y="1617991"/>
+                  </a:cubicBezTo>
+                  <a:cubicBezTo>
+                    <a:pt x="2335388" y="1583161"/>
+                    <a:pt x="2356872" y="1554664"/>
+                    <a:pt x="2383130" y="1554664"/>
+                  </a:cubicBezTo>
+                  <a:lnTo>
+                    <a:pt x="2383130" y="1523001"/>
+                  </a:lnTo>
+                  <a:cubicBezTo>
+                    <a:pt x="2344141" y="1523001"/>
+                    <a:pt x="2311517" y="1565219"/>
+                    <a:pt x="2311517" y="1617991"/>
+                  </a:cubicBezTo>
+                  <a:close/>
+                  <a:moveTo>
+                    <a:pt x="1235727" y="855963"/>
+                  </a:moveTo>
+                  <a:cubicBezTo>
+                    <a:pt x="1235727" y="803190"/>
+                    <a:pt x="1203899" y="760973"/>
+                    <a:pt x="1164113" y="760973"/>
+                  </a:cubicBezTo>
+                  <a:lnTo>
+                    <a:pt x="1164113" y="792636"/>
+                  </a:lnTo>
+                  <a:cubicBezTo>
+                    <a:pt x="1190372" y="792636"/>
+                    <a:pt x="1211856" y="821133"/>
+                    <a:pt x="1211856" y="855963"/>
+                  </a:cubicBezTo>
+                  <a:cubicBezTo>
+                    <a:pt x="1211856" y="890792"/>
+                    <a:pt x="1190372" y="919289"/>
+                    <a:pt x="1164113" y="919289"/>
+                  </a:cubicBezTo>
+                  <a:lnTo>
+                    <a:pt x="1164113" y="950952"/>
+                  </a:lnTo>
+                  <a:cubicBezTo>
+                    <a:pt x="1203899" y="950952"/>
+                    <a:pt x="1235727" y="907679"/>
+                    <a:pt x="1235727" y="855963"/>
+                  </a:cubicBezTo>
+                  <a:close/>
+                  <a:moveTo>
+                    <a:pt x="639745" y="758862"/>
+                  </a:moveTo>
+                  <a:lnTo>
+                    <a:pt x="615874" y="758862"/>
+                  </a:lnTo>
+                  <a:lnTo>
+                    <a:pt x="615874" y="948841"/>
+                  </a:lnTo>
+                  <a:lnTo>
+                    <a:pt x="639745" y="948841"/>
+                  </a:lnTo>
+                  <a:lnTo>
+                    <a:pt x="639745" y="758862"/>
+                  </a:lnTo>
+                  <a:close/>
+                  <a:moveTo>
+                    <a:pt x="1272329" y="1630656"/>
+                  </a:moveTo>
+                  <a:lnTo>
+                    <a:pt x="1272329" y="1598993"/>
+                  </a:lnTo>
+                  <a:lnTo>
+                    <a:pt x="1129103" y="1598993"/>
+                  </a:lnTo>
+                  <a:lnTo>
+                    <a:pt x="1129103" y="1630656"/>
+                  </a:lnTo>
+                  <a:lnTo>
+                    <a:pt x="1272329" y="1630656"/>
+                  </a:lnTo>
+                  <a:close/>
+                  <a:moveTo>
+                    <a:pt x="2418937" y="3149435"/>
+                  </a:moveTo>
+                  <a:lnTo>
+                    <a:pt x="2418937" y="3117772"/>
+                  </a:lnTo>
+                  <a:lnTo>
+                    <a:pt x="2275710" y="3117772"/>
+                  </a:lnTo>
+                  <a:lnTo>
+                    <a:pt x="2275710" y="3149435"/>
+                  </a:lnTo>
+                  <a:lnTo>
+                    <a:pt x="2418937" y="3149435"/>
+                  </a:lnTo>
+                  <a:close/>
+                </a:path>
+              </a:pathLst>
+            </a:custGeom>
+            <a:solidFill>
+              <a:srgbClr val="383838"/>
+            </a:solidFill>
+          </p:spPr>
+        </p:sp>
+        <p:sp>
+          <p:nvSpPr>
+            <p:cNvPr name="Freeform 6" id="6"/>
+            <p:cNvSpPr/>
+            <p:nvPr/>
+          </p:nvSpPr>
+          <p:spPr>
+            <a:xfrm>
+              <a:off x="214840" y="284969"/>
+              <a:ext cx="2423711" cy="3229649"/>
+            </a:xfrm>
+            <a:custGeom>
+              <a:avLst/>
+              <a:gdLst/>
+              <a:ahLst/>
+              <a:cxnLst/>
+              <a:rect r="r" b="b" t="t" l="l"/>
+              <a:pathLst>
+                <a:path h="3229649" w="2423711">
+                  <a:moveTo>
+                    <a:pt x="2376764" y="2470787"/>
+                  </a:moveTo>
+                  <a:lnTo>
+                    <a:pt x="2352893" y="2470787"/>
+                  </a:lnTo>
+                  <a:lnTo>
+                    <a:pt x="2352893" y="2280808"/>
+                  </a:lnTo>
+                  <a:lnTo>
+                    <a:pt x="2376764" y="2280808"/>
+                  </a:lnTo>
+                  <a:lnTo>
+                    <a:pt x="2376764" y="2470787"/>
+                  </a:lnTo>
+                  <a:close/>
+                  <a:moveTo>
+                    <a:pt x="657250" y="0"/>
+                  </a:moveTo>
+                  <a:lnTo>
+                    <a:pt x="633379" y="0"/>
+                  </a:lnTo>
+                  <a:lnTo>
+                    <a:pt x="633379" y="189979"/>
+                  </a:lnTo>
+                  <a:lnTo>
+                    <a:pt x="657250" y="189979"/>
+                  </a:lnTo>
+                  <a:lnTo>
+                    <a:pt x="657250" y="0"/>
+                  </a:lnTo>
+                  <a:close/>
+                  <a:moveTo>
+                    <a:pt x="33419" y="937231"/>
+                  </a:moveTo>
+                  <a:lnTo>
+                    <a:pt x="16710" y="915067"/>
+                  </a:lnTo>
+                  <a:lnTo>
+                    <a:pt x="117764" y="781026"/>
+                  </a:lnTo>
+                  <a:lnTo>
+                    <a:pt x="134474" y="803191"/>
+                  </a:lnTo>
+                  <a:lnTo>
+                    <a:pt x="33419" y="937231"/>
+                  </a:lnTo>
+                  <a:close/>
+                  <a:moveTo>
+                    <a:pt x="1729858" y="37996"/>
+                  </a:moveTo>
+                  <a:lnTo>
+                    <a:pt x="1746567" y="15832"/>
+                  </a:lnTo>
+                  <a:lnTo>
+                    <a:pt x="1847622" y="149873"/>
+                  </a:lnTo>
+                  <a:lnTo>
+                    <a:pt x="1830912" y="172037"/>
+                  </a:lnTo>
+                  <a:lnTo>
+                    <a:pt x="1729858" y="37996"/>
+                  </a:lnTo>
+                  <a:close/>
+                  <a:moveTo>
+                    <a:pt x="1863536" y="902402"/>
+                  </a:moveTo>
+                  <a:lnTo>
+                    <a:pt x="1839665" y="902402"/>
+                  </a:lnTo>
+                  <a:cubicBezTo>
+                    <a:pt x="1839665" y="867572"/>
+                    <a:pt x="1818181" y="839075"/>
+                    <a:pt x="1791923" y="839075"/>
+                  </a:cubicBezTo>
+                  <a:cubicBezTo>
+                    <a:pt x="1765664" y="839075"/>
+                    <a:pt x="1744180" y="867572"/>
+                    <a:pt x="1744180" y="902402"/>
+                  </a:cubicBezTo>
+                  <a:lnTo>
+                    <a:pt x="1720309" y="902402"/>
+                  </a:lnTo>
+                  <a:cubicBezTo>
+                    <a:pt x="1720309" y="849630"/>
+                    <a:pt x="1752137" y="807412"/>
+                    <a:pt x="1791923" y="807412"/>
+                  </a:cubicBezTo>
+                  <a:cubicBezTo>
+                    <a:pt x="1830912" y="807412"/>
+                    <a:pt x="1863536" y="850685"/>
+                    <a:pt x="1863536" y="902402"/>
+                  </a:cubicBezTo>
+                  <a:close/>
+                  <a:moveTo>
+                    <a:pt x="1180823" y="2460233"/>
+                  </a:moveTo>
+                  <a:lnTo>
+                    <a:pt x="1164113" y="2438068"/>
+                  </a:lnTo>
+                  <a:lnTo>
+                    <a:pt x="1265167" y="2304027"/>
+                  </a:lnTo>
+                  <a:lnTo>
+                    <a:pt x="1281877" y="2326192"/>
+                  </a:lnTo>
+                  <a:lnTo>
+                    <a:pt x="1180823" y="2460233"/>
+                  </a:lnTo>
+                  <a:close/>
+                  <a:moveTo>
+                    <a:pt x="82753" y="2469731"/>
+                  </a:moveTo>
+                  <a:lnTo>
+                    <a:pt x="58882" y="2469731"/>
+                  </a:lnTo>
+                  <a:lnTo>
+                    <a:pt x="58882" y="2279752"/>
+                  </a:lnTo>
+                  <a:lnTo>
+                    <a:pt x="82753" y="2279752"/>
+                  </a:lnTo>
+                  <a:lnTo>
+                    <a:pt x="82753" y="2469731"/>
+                  </a:lnTo>
+                  <a:close/>
+                  <a:moveTo>
+                    <a:pt x="1803062" y="3229649"/>
+                  </a:moveTo>
+                  <a:lnTo>
+                    <a:pt x="1779191" y="3229649"/>
+                  </a:lnTo>
+                  <a:lnTo>
+                    <a:pt x="1779191" y="3039670"/>
+                  </a:lnTo>
+                  <a:lnTo>
+                    <a:pt x="1803062" y="3039670"/>
+                  </a:lnTo>
+                  <a:lnTo>
+                    <a:pt x="1803062" y="3229649"/>
+                  </a:lnTo>
+                  <a:close/>
+                  <a:moveTo>
+                    <a:pt x="143226" y="3182154"/>
+                  </a:moveTo>
+                  <a:lnTo>
+                    <a:pt x="119355" y="3182154"/>
+                  </a:lnTo>
+                  <a:cubicBezTo>
+                    <a:pt x="119355" y="3147325"/>
+                    <a:pt x="97871" y="3118827"/>
+                    <a:pt x="71613" y="3118827"/>
+                  </a:cubicBezTo>
+                  <a:cubicBezTo>
+                    <a:pt x="45355" y="3118827"/>
+                    <a:pt x="23871" y="3147325"/>
+                    <a:pt x="23871" y="3182154"/>
+                  </a:cubicBezTo>
+                  <a:lnTo>
+                    <a:pt x="0" y="3182154"/>
+                  </a:lnTo>
+                  <a:cubicBezTo>
+                    <a:pt x="0" y="3129382"/>
+                    <a:pt x="31828" y="3087164"/>
+                    <a:pt x="71613" y="3087164"/>
+                  </a:cubicBezTo>
+                  <a:cubicBezTo>
+                    <a:pt x="111398" y="3087164"/>
+                    <a:pt x="143226" y="3129382"/>
+                    <a:pt x="143226" y="3182154"/>
+                  </a:cubicBezTo>
+                  <a:close/>
+                  <a:moveTo>
+                    <a:pt x="2322656" y="173092"/>
+                  </a:moveTo>
+                  <a:lnTo>
+                    <a:pt x="2305946" y="150928"/>
+                  </a:lnTo>
+                  <a:lnTo>
+                    <a:pt x="2407001" y="16887"/>
+                  </a:lnTo>
+                  <a:lnTo>
+                    <a:pt x="2423710" y="39051"/>
+                  </a:lnTo>
+                  <a:lnTo>
+                    <a:pt x="2322656" y="173092"/>
+                  </a:lnTo>
+                  <a:close/>
+                  <a:moveTo>
+                    <a:pt x="601551" y="3216984"/>
+                  </a:moveTo>
+                  <a:lnTo>
+                    <a:pt x="584841" y="3194819"/>
+                  </a:lnTo>
+                  <a:lnTo>
+                    <a:pt x="685896" y="3060778"/>
+                  </a:lnTo>
+                  <a:lnTo>
+                    <a:pt x="702605" y="3082942"/>
+                  </a:lnTo>
+                  <a:lnTo>
+                    <a:pt x="601551" y="3216984"/>
+                  </a:lnTo>
+                  <a:close/>
+                  <a:moveTo>
+                    <a:pt x="1746567" y="1696093"/>
+                  </a:moveTo>
+                  <a:lnTo>
+                    <a:pt x="1729858" y="1673929"/>
+                  </a:lnTo>
+                  <a:lnTo>
+                    <a:pt x="1830912" y="1539888"/>
+                  </a:lnTo>
+                  <a:lnTo>
+                    <a:pt x="1847622" y="1562052"/>
+                  </a:lnTo>
+                  <a:lnTo>
+                    <a:pt x="1746567" y="1696093"/>
+                  </a:lnTo>
+                  <a:close/>
+                  <a:moveTo>
+                    <a:pt x="573701" y="1567330"/>
+                  </a:moveTo>
+                  <a:lnTo>
+                    <a:pt x="597573" y="1567330"/>
+                  </a:lnTo>
+                  <a:cubicBezTo>
+                    <a:pt x="597573" y="1602159"/>
+                    <a:pt x="619056" y="1630656"/>
+                    <a:pt x="645315" y="1630656"/>
+                  </a:cubicBezTo>
+                  <a:cubicBezTo>
+                    <a:pt x="671573" y="1630656"/>
+                    <a:pt x="693057" y="1602159"/>
+                    <a:pt x="693057" y="1567330"/>
+                  </a:cubicBezTo>
+                  <a:lnTo>
+                    <a:pt x="716928" y="1567330"/>
+                  </a:lnTo>
+                  <a:cubicBezTo>
+                    <a:pt x="716928" y="1620102"/>
+                    <a:pt x="685100" y="1662319"/>
+                    <a:pt x="645315" y="1662319"/>
+                  </a:cubicBezTo>
+                  <a:cubicBezTo>
+                    <a:pt x="606325" y="1662319"/>
+                    <a:pt x="573701" y="1620102"/>
+                    <a:pt x="573701" y="1567330"/>
+                  </a:cubicBezTo>
+                  <a:close/>
+                  <a:moveTo>
+                    <a:pt x="1863536" y="2421181"/>
+                  </a:moveTo>
+                  <a:lnTo>
+                    <a:pt x="1839665" y="2421181"/>
+                  </a:lnTo>
+                  <a:cubicBezTo>
+                    <a:pt x="1839665" y="2386352"/>
+                    <a:pt x="1818181" y="2357855"/>
+                    <a:pt x="1791923" y="2357855"/>
+                  </a:cubicBezTo>
+                  <a:cubicBezTo>
+                    <a:pt x="1765664" y="2357855"/>
+                    <a:pt x="1744180" y="2386352"/>
+                    <a:pt x="1744180" y="2421181"/>
+                  </a:cubicBezTo>
+                  <a:lnTo>
+                    <a:pt x="1720309" y="2421181"/>
+                  </a:lnTo>
+                  <a:cubicBezTo>
+                    <a:pt x="1720309" y="2368409"/>
+                    <a:pt x="1752137" y="2326192"/>
+                    <a:pt x="1791923" y="2326192"/>
+                  </a:cubicBezTo>
+                  <a:cubicBezTo>
+                    <a:pt x="1831708" y="2326192"/>
+                    <a:pt x="1863536" y="2369465"/>
+                    <a:pt x="1863536" y="2421181"/>
+                  </a:cubicBezTo>
+                  <a:close/>
+                </a:path>
+              </a:pathLst>
+            </a:custGeom>
+            <a:solidFill>
+              <a:srgbClr val="2ED47B"/>
+            </a:solidFill>
+          </p:spPr>
+        </p:sp>
+      </p:grpSp>
+      <p:pic>
+        <p:nvPicPr>
+          <p:cNvPr name="Picture 7" id="7"/>
+          <p:cNvPicPr>
+            <a:picLocks noChangeAspect="true"/>
+          </p:cNvPicPr>
+          <p:nvPr/>
+        </p:nvPicPr>
+        <p:blipFill>
+          <a:blip r:embed="rId2"/>
+          <a:srcRect l="0" t="0" r="0" b="0"/>
+          <a:stretch>
+            <a:fillRect/>
+          </a:stretch>
+        </p:blipFill>
+        <p:spPr>
+          <a:xfrm flipH="false" flipV="false" rot="0">
+            <a:off x="1018740" y="4277039"/>
+            <a:ext cx="6322445" cy="3723729"/>
+          </a:xfrm>
+          <a:prstGeom prst="rect">
+            <a:avLst/>
+          </a:prstGeom>
+        </p:spPr>
+      </p:pic>
+      <p:pic>
+        <p:nvPicPr>
+          <p:cNvPr name="Picture 8" id="8"/>
+          <p:cNvPicPr>
+            <a:picLocks noChangeAspect="true"/>
+          </p:cNvPicPr>
+          <p:nvPr/>
+        </p:nvPicPr>
+        <p:blipFill>
+          <a:blip r:embed="rId3"/>
+          <a:srcRect l="0" t="0" r="0" b="0"/>
+          <a:stretch>
+            <a:fillRect/>
+          </a:stretch>
+        </p:blipFill>
+        <p:spPr>
+          <a:xfrm flipH="false" flipV="false" rot="0">
+            <a:off x="6701515" y="3223931"/>
+            <a:ext cx="6512640" cy="3839137"/>
+          </a:xfrm>
+          <a:prstGeom prst="rect">
+            <a:avLst/>
+          </a:prstGeom>
+        </p:spPr>
+      </p:pic>
+      <p:pic>
+        <p:nvPicPr>
+          <p:cNvPr name="Picture 9" id="9"/>
+          <p:cNvPicPr>
+            <a:picLocks noChangeAspect="true"/>
+          </p:cNvPicPr>
+          <p:nvPr/>
+        </p:nvPicPr>
+        <p:blipFill>
+          <a:blip r:embed="rId4"/>
+          <a:srcRect l="0" t="0" r="0" b="0"/>
+          <a:stretch>
+            <a:fillRect/>
+          </a:stretch>
+        </p:blipFill>
+        <p:spPr>
+          <a:xfrm flipH="false" flipV="false" rot="0">
+            <a:off x="7559747" y="6265453"/>
+            <a:ext cx="6291416" cy="3700255"/>
+          </a:xfrm>
+          <a:prstGeom prst="rect">
+            <a:avLst/>
+          </a:prstGeom>
+        </p:spPr>
+      </p:pic>
+      <p:sp>
+        <p:nvSpPr>
+          <p:cNvPr name="TextBox 10" id="10"/>
+          <p:cNvSpPr txBox="true"/>
+          <p:nvPr/>
+        </p:nvSpPr>
+        <p:spPr>
+          <a:xfrm rot="0">
+            <a:off x="14069725" y="6867885"/>
+            <a:ext cx="3189575" cy="2803731"/>
+          </a:xfrm>
+          <a:prstGeom prst="rect">
+            <a:avLst/>
+          </a:prstGeom>
+        </p:spPr>
+        <p:txBody>
+          <a:bodyPr anchor="t" rtlCol="false" tIns="0" lIns="0" bIns="0" rIns="0">
+            <a:spAutoFit/>
+          </a:bodyPr>
+          <a:lstStyle/>
+          <a:p>
+            <a:pPr algn="r">
+              <a:lnSpc>
+                <a:spcPts val="22925"/>
+              </a:lnSpc>
+              <a:spcBef>
+                <a:spcPct val="0"/>
+              </a:spcBef>
+            </a:pPr>
+            <a:r>
+              <a:rPr lang="en-US" sz="16375">
+                <a:solidFill>
+                  <a:srgbClr val="242725">
+                    <a:alpha val="7843"/>
+                  </a:srgbClr>
+                </a:solidFill>
+                <a:latin typeface="Inter Bold"/>
+              </a:rPr>
+              <a:t>03</a:t>
+            </a:r>
+          </a:p>
+        </p:txBody>
+      </p:sp>
+      <p:grpSp>
+        <p:nvGrpSpPr>
+          <p:cNvPr name="Group 11" id="11"/>
+          <p:cNvGrpSpPr/>
+          <p:nvPr/>
+        </p:nvGrpSpPr>
+        <p:grpSpPr>
+          <a:xfrm rot="0">
+            <a:off x="1028700" y="1028700"/>
+            <a:ext cx="8413000" cy="2887962"/>
+            <a:chOff x="0" y="0"/>
+            <a:chExt cx="11217333" cy="3850616"/>
+          </a:xfrm>
+        </p:grpSpPr>
+        <p:sp>
+          <p:nvSpPr>
+            <p:cNvPr name="TextBox 12" id="12"/>
+            <p:cNvSpPr txBox="true"/>
+            <p:nvPr/>
+          </p:nvSpPr>
+          <p:spPr>
+            <a:xfrm rot="0">
+              <a:off x="0" y="180975"/>
+              <a:ext cx="11217333" cy="2247265"/>
+            </a:xfrm>
+            <a:prstGeom prst="rect">
+              <a:avLst/>
+            </a:prstGeom>
+          </p:spPr>
+          <p:txBody>
+            <a:bodyPr anchor="t" rtlCol="false" tIns="0" lIns="0" bIns="0" rIns="0">
+              <a:spAutoFit/>
+            </a:bodyPr>
+            <a:lstStyle/>
+            <a:p>
+              <a:pPr>
+                <a:lnSpc>
+                  <a:spcPts val="12360"/>
+                </a:lnSpc>
+              </a:pPr>
+              <a:r>
+                <a:rPr lang="en-US" sz="12000">
+                  <a:solidFill>
+                    <a:srgbClr val="0F1210"/>
+                  </a:solidFill>
+                  <a:latin typeface="Baron Bold"/>
+                </a:rPr>
+                <a:t>КОСМИК</a:t>
+              </a:r>
+            </a:p>
+          </p:txBody>
+        </p:sp>
+        <p:sp>
+          <p:nvSpPr>
+            <p:cNvPr name="TextBox 13" id="13"/>
+            <p:cNvSpPr txBox="true"/>
+            <p:nvPr/>
+          </p:nvSpPr>
+          <p:spPr>
+            <a:xfrm rot="0">
+              <a:off x="0" y="2724550"/>
+              <a:ext cx="11217333" cy="1126067"/>
+            </a:xfrm>
+            <a:prstGeom prst="rect">
+              <a:avLst/>
+            </a:prstGeom>
+          </p:spPr>
+          <p:txBody>
+            <a:bodyPr anchor="t" rtlCol="false" tIns="0" lIns="0" bIns="0" rIns="0">
+              <a:spAutoFit/>
+            </a:bodyPr>
+            <a:lstStyle/>
+            <a:p>
+              <a:pPr>
+                <a:lnSpc>
+                  <a:spcPts val="7000"/>
+                </a:lnSpc>
+                <a:spcBef>
+                  <a:spcPct val="0"/>
+                </a:spcBef>
+              </a:pPr>
+              <a:r>
+                <a:rPr lang="en-US" sz="5000">
+                  <a:solidFill>
+                    <a:srgbClr val="0F1210"/>
+                  </a:solidFill>
+                  <a:latin typeface="Klein Black"/>
+                </a:rPr>
+                <a:t>Введение</a:t>
+              </a:r>
+            </a:p>
+          </p:txBody>
+        </p:sp>
+      </p:grpSp>
+    </p:spTree>
+  </p:cSld>
+  <p:clrMapOvr>
+    <a:masterClrMapping/>
+  </p:clrMapOvr>
+</p:sld>
+</file>
+
+<file path=ppt/slides/slide4.xml><?xml version="1.0" encoding="utf-8"?>
 <p:sld xmlns:p="http://schemas.openxmlformats.org/presentationml/2006/main" xmlns:a="http://schemas.openxmlformats.org/drawingml/2006/main" xmlns:r="http://schemas.openxmlformats.org/officeDocument/2006/relationships">
   <p:cSld>
     <p:bg>
@@ -6321,7 +7231,7 @@
                 </a:solidFill>
                 <a:latin typeface="Inter Bold"/>
               </a:rPr>
-              <a:t>03</a:t>
+              <a:t>04</a:t>
             </a:r>
           </a:p>
         </p:txBody>
@@ -6334,7 +7244,7 @@
 </p:sld>
 </file>
 
-<file path=ppt/slides/slide4.xml><?xml version="1.0" encoding="utf-8"?>
+<file path=ppt/slides/slide5.xml><?xml version="1.0" encoding="utf-8"?>
 <p:sld xmlns:p="http://schemas.openxmlformats.org/presentationml/2006/main" xmlns:a="http://schemas.openxmlformats.org/drawingml/2006/main" xmlns:r="http://schemas.openxmlformats.org/officeDocument/2006/relationships">
   <p:cSld>
     <p:bg>
@@ -6490,6 +7400,601 @@
         </p:nvGrpSpPr>
         <p:grpSpPr>
           <a:xfrm rot="0">
+            <a:off x="3927264" y="3045989"/>
+            <a:ext cx="2912577" cy="2839113"/>
+            <a:chOff x="0" y="0"/>
+            <a:chExt cx="4589780" cy="4578350"/>
+          </a:xfrm>
+        </p:grpSpPr>
+        <p:sp>
+          <p:nvSpPr>
+            <p:cNvPr name="Freeform 7" id="7"/>
+            <p:cNvSpPr/>
+            <p:nvPr/>
+          </p:nvSpPr>
+          <p:spPr>
+            <a:xfrm>
+              <a:off x="232345" y="209944"/>
+              <a:ext cx="2418937" cy="2345148"/>
+            </a:xfrm>
+            <a:custGeom>
+              <a:avLst/>
+              <a:gdLst/>
+              <a:ahLst/>
+              <a:cxnLst/>
+              <a:rect r="r" b="b" t="t" l="l"/>
+              <a:pathLst>
+                <a:path h="2345148" w="2418937">
+                  <a:moveTo>
+                    <a:pt x="20688" y="139962"/>
+                  </a:moveTo>
+                  <a:lnTo>
+                    <a:pt x="20688" y="116635"/>
+                  </a:lnTo>
+                  <a:cubicBezTo>
+                    <a:pt x="46947" y="116635"/>
+                    <a:pt x="68431" y="95641"/>
+                    <a:pt x="68431" y="69981"/>
+                  </a:cubicBezTo>
+                  <a:cubicBezTo>
+                    <a:pt x="68431" y="44321"/>
+                    <a:pt x="46947" y="23327"/>
+                    <a:pt x="20688" y="23327"/>
+                  </a:cubicBezTo>
+                  <a:lnTo>
+                    <a:pt x="20688" y="0"/>
+                  </a:lnTo>
+                  <a:cubicBezTo>
+                    <a:pt x="60474" y="0"/>
+                    <a:pt x="92302" y="31102"/>
+                    <a:pt x="92302" y="69981"/>
+                  </a:cubicBezTo>
+                  <a:cubicBezTo>
+                    <a:pt x="92302" y="108859"/>
+                    <a:pt x="60474" y="139962"/>
+                    <a:pt x="20688" y="139962"/>
+                  </a:cubicBezTo>
+                  <a:close/>
+                  <a:moveTo>
+                    <a:pt x="1273125" y="80867"/>
+                  </a:moveTo>
+                  <a:lnTo>
+                    <a:pt x="1273125" y="57540"/>
+                  </a:lnTo>
+                  <a:lnTo>
+                    <a:pt x="1129898" y="57540"/>
+                  </a:lnTo>
+                  <a:lnTo>
+                    <a:pt x="1129898" y="80867"/>
+                  </a:lnTo>
+                  <a:lnTo>
+                    <a:pt x="1273125" y="80867"/>
+                  </a:lnTo>
+                  <a:close/>
+                  <a:moveTo>
+                    <a:pt x="1201511" y="2345148"/>
+                  </a:moveTo>
+                  <a:cubicBezTo>
+                    <a:pt x="1241297" y="2345148"/>
+                    <a:pt x="1273125" y="2314045"/>
+                    <a:pt x="1273125" y="2275167"/>
+                  </a:cubicBezTo>
+                  <a:lnTo>
+                    <a:pt x="1249254" y="2275167"/>
+                  </a:lnTo>
+                  <a:cubicBezTo>
+                    <a:pt x="1249254" y="2300827"/>
+                    <a:pt x="1227770" y="2321821"/>
+                    <a:pt x="1201511" y="2321821"/>
+                  </a:cubicBezTo>
+                  <a:cubicBezTo>
+                    <a:pt x="1175253" y="2321821"/>
+                    <a:pt x="1153769" y="2300827"/>
+                    <a:pt x="1153769" y="2275167"/>
+                  </a:cubicBezTo>
+                  <a:lnTo>
+                    <a:pt x="1129898" y="2275167"/>
+                  </a:lnTo>
+                  <a:cubicBezTo>
+                    <a:pt x="1129898" y="2313268"/>
+                    <a:pt x="1161726" y="2345148"/>
+                    <a:pt x="1201511" y="2345148"/>
+                  </a:cubicBezTo>
+                  <a:close/>
+                  <a:moveTo>
+                    <a:pt x="592799" y="1748753"/>
+                  </a:moveTo>
+                  <a:cubicBezTo>
+                    <a:pt x="592799" y="1787631"/>
+                    <a:pt x="624627" y="1818734"/>
+                    <a:pt x="664412" y="1818734"/>
+                  </a:cubicBezTo>
+                  <a:lnTo>
+                    <a:pt x="664412" y="1795407"/>
+                  </a:lnTo>
+                  <a:cubicBezTo>
+                    <a:pt x="638154" y="1795407"/>
+                    <a:pt x="616670" y="1774412"/>
+                    <a:pt x="616670" y="1748753"/>
+                  </a:cubicBezTo>
+                  <a:cubicBezTo>
+                    <a:pt x="616670" y="1723093"/>
+                    <a:pt x="638154" y="1702098"/>
+                    <a:pt x="664412" y="1702098"/>
+                  </a:cubicBezTo>
+                  <a:lnTo>
+                    <a:pt x="664412" y="1678771"/>
+                  </a:lnTo>
+                  <a:cubicBezTo>
+                    <a:pt x="625423" y="1678771"/>
+                    <a:pt x="592799" y="1710652"/>
+                    <a:pt x="592799" y="1748753"/>
+                  </a:cubicBezTo>
+                  <a:close/>
+                  <a:moveTo>
+                    <a:pt x="101054" y="1245665"/>
+                  </a:moveTo>
+                  <a:lnTo>
+                    <a:pt x="117764" y="1228559"/>
+                  </a:lnTo>
+                  <a:lnTo>
+                    <a:pt x="16710" y="1129808"/>
+                  </a:lnTo>
+                  <a:lnTo>
+                    <a:pt x="0" y="1146137"/>
+                  </a:lnTo>
+                  <a:lnTo>
+                    <a:pt x="101054" y="1245665"/>
+                  </a:lnTo>
+                  <a:close/>
+                  <a:moveTo>
+                    <a:pt x="2418937" y="644604"/>
+                  </a:moveTo>
+                  <a:lnTo>
+                    <a:pt x="2418937" y="621277"/>
+                  </a:lnTo>
+                  <a:lnTo>
+                    <a:pt x="2275710" y="621277"/>
+                  </a:lnTo>
+                  <a:lnTo>
+                    <a:pt x="2275710" y="644604"/>
+                  </a:lnTo>
+                  <a:lnTo>
+                    <a:pt x="2418937" y="644604"/>
+                  </a:lnTo>
+                  <a:close/>
+                  <a:moveTo>
+                    <a:pt x="2311517" y="1192013"/>
+                  </a:moveTo>
+                  <a:cubicBezTo>
+                    <a:pt x="2311517" y="1230892"/>
+                    <a:pt x="2343345" y="1261994"/>
+                    <a:pt x="2383130" y="1261994"/>
+                  </a:cubicBezTo>
+                  <a:lnTo>
+                    <a:pt x="2383130" y="1238667"/>
+                  </a:lnTo>
+                  <a:cubicBezTo>
+                    <a:pt x="2356872" y="1238667"/>
+                    <a:pt x="2335388" y="1217673"/>
+                    <a:pt x="2335388" y="1192013"/>
+                  </a:cubicBezTo>
+                  <a:cubicBezTo>
+                    <a:pt x="2335388" y="1166353"/>
+                    <a:pt x="2356872" y="1145359"/>
+                    <a:pt x="2383130" y="1145359"/>
+                  </a:cubicBezTo>
+                  <a:lnTo>
+                    <a:pt x="2383130" y="1122032"/>
+                  </a:lnTo>
+                  <a:cubicBezTo>
+                    <a:pt x="2344141" y="1122032"/>
+                    <a:pt x="2311517" y="1153135"/>
+                    <a:pt x="2311517" y="1192013"/>
+                  </a:cubicBezTo>
+                  <a:close/>
+                  <a:moveTo>
+                    <a:pt x="1235727" y="630608"/>
+                  </a:moveTo>
+                  <a:cubicBezTo>
+                    <a:pt x="1235727" y="591730"/>
+                    <a:pt x="1203899" y="560627"/>
+                    <a:pt x="1164113" y="560627"/>
+                  </a:cubicBezTo>
+                  <a:lnTo>
+                    <a:pt x="1164113" y="583954"/>
+                  </a:lnTo>
+                  <a:cubicBezTo>
+                    <a:pt x="1190372" y="583954"/>
+                    <a:pt x="1211856" y="604948"/>
+                    <a:pt x="1211856" y="630608"/>
+                  </a:cubicBezTo>
+                  <a:cubicBezTo>
+                    <a:pt x="1211856" y="656268"/>
+                    <a:pt x="1190372" y="677262"/>
+                    <a:pt x="1164113" y="677262"/>
+                  </a:cubicBezTo>
+                  <a:lnTo>
+                    <a:pt x="1164113" y="700589"/>
+                  </a:lnTo>
+                  <a:cubicBezTo>
+                    <a:pt x="1203899" y="700589"/>
+                    <a:pt x="1235727" y="668709"/>
+                    <a:pt x="1235727" y="630608"/>
+                  </a:cubicBezTo>
+                  <a:close/>
+                  <a:moveTo>
+                    <a:pt x="639745" y="559072"/>
+                  </a:moveTo>
+                  <a:lnTo>
+                    <a:pt x="615874" y="559072"/>
+                  </a:lnTo>
+                  <a:lnTo>
+                    <a:pt x="615874" y="699034"/>
+                  </a:lnTo>
+                  <a:lnTo>
+                    <a:pt x="639745" y="699034"/>
+                  </a:lnTo>
+                  <a:lnTo>
+                    <a:pt x="639745" y="559072"/>
+                  </a:lnTo>
+                  <a:close/>
+                  <a:moveTo>
+                    <a:pt x="1272329" y="1201344"/>
+                  </a:moveTo>
+                  <a:lnTo>
+                    <a:pt x="1272329" y="1178017"/>
+                  </a:lnTo>
+                  <a:lnTo>
+                    <a:pt x="1129103" y="1178017"/>
+                  </a:lnTo>
+                  <a:lnTo>
+                    <a:pt x="1129103" y="1201344"/>
+                  </a:lnTo>
+                  <a:lnTo>
+                    <a:pt x="1272329" y="1201344"/>
+                  </a:lnTo>
+                  <a:close/>
+                  <a:moveTo>
+                    <a:pt x="2418937" y="2320266"/>
+                  </a:moveTo>
+                  <a:lnTo>
+                    <a:pt x="2418937" y="2296939"/>
+                  </a:lnTo>
+                  <a:lnTo>
+                    <a:pt x="2275710" y="2296939"/>
+                  </a:lnTo>
+                  <a:lnTo>
+                    <a:pt x="2275710" y="2320266"/>
+                  </a:lnTo>
+                  <a:lnTo>
+                    <a:pt x="2418937" y="2320266"/>
+                  </a:lnTo>
+                  <a:close/>
+                </a:path>
+              </a:pathLst>
+            </a:custGeom>
+            <a:solidFill>
+              <a:srgbClr val="383838"/>
+            </a:solidFill>
+          </p:spPr>
+        </p:sp>
+        <p:sp>
+          <p:nvSpPr>
+            <p:cNvPr name="Freeform 8" id="8"/>
+            <p:cNvSpPr/>
+            <p:nvPr/>
+          </p:nvSpPr>
+          <p:spPr>
+            <a:xfrm>
+              <a:off x="214840" y="209944"/>
+              <a:ext cx="2423711" cy="2379361"/>
+            </a:xfrm>
+            <a:custGeom>
+              <a:avLst/>
+              <a:gdLst/>
+              <a:ahLst/>
+              <a:cxnLst/>
+              <a:rect r="r" b="b" t="t" l="l"/>
+              <a:pathLst>
+                <a:path h="2379361" w="2423711">
+                  <a:moveTo>
+                    <a:pt x="2376764" y="1820289"/>
+                  </a:moveTo>
+                  <a:lnTo>
+                    <a:pt x="2352893" y="1820289"/>
+                  </a:lnTo>
+                  <a:lnTo>
+                    <a:pt x="2352893" y="1680326"/>
+                  </a:lnTo>
+                  <a:lnTo>
+                    <a:pt x="2376764" y="1680326"/>
+                  </a:lnTo>
+                  <a:lnTo>
+                    <a:pt x="2376764" y="1820289"/>
+                  </a:lnTo>
+                  <a:close/>
+                  <a:moveTo>
+                    <a:pt x="657250" y="0"/>
+                  </a:moveTo>
+                  <a:lnTo>
+                    <a:pt x="633379" y="0"/>
+                  </a:lnTo>
+                  <a:lnTo>
+                    <a:pt x="633379" y="139962"/>
+                  </a:lnTo>
+                  <a:lnTo>
+                    <a:pt x="657250" y="139962"/>
+                  </a:lnTo>
+                  <a:lnTo>
+                    <a:pt x="657250" y="0"/>
+                  </a:lnTo>
+                  <a:close/>
+                  <a:moveTo>
+                    <a:pt x="33419" y="690481"/>
+                  </a:moveTo>
+                  <a:lnTo>
+                    <a:pt x="16710" y="674152"/>
+                  </a:lnTo>
+                  <a:lnTo>
+                    <a:pt x="117764" y="575401"/>
+                  </a:lnTo>
+                  <a:lnTo>
+                    <a:pt x="134474" y="591730"/>
+                  </a:lnTo>
+                  <a:lnTo>
+                    <a:pt x="33419" y="690481"/>
+                  </a:lnTo>
+                  <a:close/>
+                  <a:moveTo>
+                    <a:pt x="1729858" y="27992"/>
+                  </a:moveTo>
+                  <a:lnTo>
+                    <a:pt x="1746567" y="11663"/>
+                  </a:lnTo>
+                  <a:lnTo>
+                    <a:pt x="1847622" y="110414"/>
+                  </a:lnTo>
+                  <a:lnTo>
+                    <a:pt x="1830912" y="126743"/>
+                  </a:lnTo>
+                  <a:lnTo>
+                    <a:pt x="1729858" y="27992"/>
+                  </a:lnTo>
+                  <a:close/>
+                  <a:moveTo>
+                    <a:pt x="1863536" y="664821"/>
+                  </a:moveTo>
+                  <a:lnTo>
+                    <a:pt x="1839665" y="664821"/>
+                  </a:lnTo>
+                  <a:cubicBezTo>
+                    <a:pt x="1839665" y="639161"/>
+                    <a:pt x="1818181" y="618167"/>
+                    <a:pt x="1791923" y="618167"/>
+                  </a:cubicBezTo>
+                  <a:cubicBezTo>
+                    <a:pt x="1765664" y="618167"/>
+                    <a:pt x="1744180" y="639161"/>
+                    <a:pt x="1744180" y="664821"/>
+                  </a:cubicBezTo>
+                  <a:lnTo>
+                    <a:pt x="1720309" y="664821"/>
+                  </a:lnTo>
+                  <a:cubicBezTo>
+                    <a:pt x="1720309" y="625943"/>
+                    <a:pt x="1752137" y="594840"/>
+                    <a:pt x="1791923" y="594840"/>
+                  </a:cubicBezTo>
+                  <a:cubicBezTo>
+                    <a:pt x="1830912" y="594840"/>
+                    <a:pt x="1863536" y="626720"/>
+                    <a:pt x="1863536" y="664821"/>
+                  </a:cubicBezTo>
+                  <a:close/>
+                  <a:moveTo>
+                    <a:pt x="1180823" y="1812513"/>
+                  </a:moveTo>
+                  <a:lnTo>
+                    <a:pt x="1164113" y="1796184"/>
+                  </a:lnTo>
+                  <a:lnTo>
+                    <a:pt x="1265167" y="1697433"/>
+                  </a:lnTo>
+                  <a:lnTo>
+                    <a:pt x="1281877" y="1713762"/>
+                  </a:lnTo>
+                  <a:lnTo>
+                    <a:pt x="1180823" y="1812513"/>
+                  </a:lnTo>
+                  <a:close/>
+                  <a:moveTo>
+                    <a:pt x="82753" y="1819511"/>
+                  </a:moveTo>
+                  <a:lnTo>
+                    <a:pt x="58882" y="1819511"/>
+                  </a:lnTo>
+                  <a:lnTo>
+                    <a:pt x="58882" y="1679549"/>
+                  </a:lnTo>
+                  <a:lnTo>
+                    <a:pt x="82753" y="1679549"/>
+                  </a:lnTo>
+                  <a:lnTo>
+                    <a:pt x="82753" y="1819511"/>
+                  </a:lnTo>
+                  <a:close/>
+                  <a:moveTo>
+                    <a:pt x="1803062" y="2379361"/>
+                  </a:moveTo>
+                  <a:lnTo>
+                    <a:pt x="1779191" y="2379361"/>
+                  </a:lnTo>
+                  <a:lnTo>
+                    <a:pt x="1779191" y="2239399"/>
+                  </a:lnTo>
+                  <a:lnTo>
+                    <a:pt x="1803062" y="2239399"/>
+                  </a:lnTo>
+                  <a:lnTo>
+                    <a:pt x="1803062" y="2379361"/>
+                  </a:lnTo>
+                  <a:close/>
+                  <a:moveTo>
+                    <a:pt x="143226" y="2344370"/>
+                  </a:moveTo>
+                  <a:lnTo>
+                    <a:pt x="119355" y="2344370"/>
+                  </a:lnTo>
+                  <a:cubicBezTo>
+                    <a:pt x="119355" y="2318711"/>
+                    <a:pt x="97871" y="2297716"/>
+                    <a:pt x="71613" y="2297716"/>
+                  </a:cubicBezTo>
+                  <a:cubicBezTo>
+                    <a:pt x="45355" y="2297716"/>
+                    <a:pt x="23871" y="2318711"/>
+                    <a:pt x="23871" y="2344370"/>
+                  </a:cubicBezTo>
+                  <a:lnTo>
+                    <a:pt x="0" y="2344370"/>
+                  </a:lnTo>
+                  <a:cubicBezTo>
+                    <a:pt x="0" y="2305492"/>
+                    <a:pt x="31828" y="2274389"/>
+                    <a:pt x="71613" y="2274389"/>
+                  </a:cubicBezTo>
+                  <a:cubicBezTo>
+                    <a:pt x="111398" y="2274389"/>
+                    <a:pt x="143226" y="2305492"/>
+                    <a:pt x="143226" y="2344370"/>
+                  </a:cubicBezTo>
+                  <a:close/>
+                  <a:moveTo>
+                    <a:pt x="2322656" y="127521"/>
+                  </a:moveTo>
+                  <a:lnTo>
+                    <a:pt x="2305946" y="111192"/>
+                  </a:lnTo>
+                  <a:lnTo>
+                    <a:pt x="2407001" y="12441"/>
+                  </a:lnTo>
+                  <a:lnTo>
+                    <a:pt x="2423710" y="28770"/>
+                  </a:lnTo>
+                  <a:lnTo>
+                    <a:pt x="2322656" y="127521"/>
+                  </a:lnTo>
+                  <a:close/>
+                  <a:moveTo>
+                    <a:pt x="601551" y="2370030"/>
+                  </a:moveTo>
+                  <a:lnTo>
+                    <a:pt x="584841" y="2353701"/>
+                  </a:lnTo>
+                  <a:lnTo>
+                    <a:pt x="685896" y="2254950"/>
+                  </a:lnTo>
+                  <a:lnTo>
+                    <a:pt x="702605" y="2271279"/>
+                  </a:lnTo>
+                  <a:lnTo>
+                    <a:pt x="601551" y="2370030"/>
+                  </a:lnTo>
+                  <a:close/>
+                  <a:moveTo>
+                    <a:pt x="1746567" y="1249553"/>
+                  </a:moveTo>
+                  <a:lnTo>
+                    <a:pt x="1729858" y="1233224"/>
+                  </a:lnTo>
+                  <a:lnTo>
+                    <a:pt x="1830912" y="1134473"/>
+                  </a:lnTo>
+                  <a:lnTo>
+                    <a:pt x="1847622" y="1150802"/>
+                  </a:lnTo>
+                  <a:lnTo>
+                    <a:pt x="1746567" y="1249553"/>
+                  </a:lnTo>
+                  <a:close/>
+                  <a:moveTo>
+                    <a:pt x="573701" y="1154690"/>
+                  </a:moveTo>
+                  <a:lnTo>
+                    <a:pt x="597573" y="1154690"/>
+                  </a:lnTo>
+                  <a:cubicBezTo>
+                    <a:pt x="597573" y="1180350"/>
+                    <a:pt x="619056" y="1201344"/>
+                    <a:pt x="645315" y="1201344"/>
+                  </a:cubicBezTo>
+                  <a:cubicBezTo>
+                    <a:pt x="671573" y="1201344"/>
+                    <a:pt x="693057" y="1180350"/>
+                    <a:pt x="693057" y="1154690"/>
+                  </a:cubicBezTo>
+                  <a:lnTo>
+                    <a:pt x="716928" y="1154690"/>
+                  </a:lnTo>
+                  <a:cubicBezTo>
+                    <a:pt x="716928" y="1193568"/>
+                    <a:pt x="685100" y="1224671"/>
+                    <a:pt x="645315" y="1224671"/>
+                  </a:cubicBezTo>
+                  <a:cubicBezTo>
+                    <a:pt x="606325" y="1224671"/>
+                    <a:pt x="573701" y="1193568"/>
+                    <a:pt x="573701" y="1154690"/>
+                  </a:cubicBezTo>
+                  <a:close/>
+                  <a:moveTo>
+                    <a:pt x="1863536" y="1783743"/>
+                  </a:moveTo>
+                  <a:lnTo>
+                    <a:pt x="1839665" y="1783743"/>
+                  </a:lnTo>
+                  <a:cubicBezTo>
+                    <a:pt x="1839665" y="1758083"/>
+                    <a:pt x="1818181" y="1737089"/>
+                    <a:pt x="1791923" y="1737089"/>
+                  </a:cubicBezTo>
+                  <a:cubicBezTo>
+                    <a:pt x="1765664" y="1737089"/>
+                    <a:pt x="1744180" y="1758083"/>
+                    <a:pt x="1744180" y="1783743"/>
+                  </a:cubicBezTo>
+                  <a:lnTo>
+                    <a:pt x="1720309" y="1783743"/>
+                  </a:lnTo>
+                  <a:cubicBezTo>
+                    <a:pt x="1720309" y="1744865"/>
+                    <a:pt x="1752137" y="1713762"/>
+                    <a:pt x="1791923" y="1713762"/>
+                  </a:cubicBezTo>
+                  <a:cubicBezTo>
+                    <a:pt x="1831708" y="1713762"/>
+                    <a:pt x="1863536" y="1745642"/>
+                    <a:pt x="1863536" y="1783743"/>
+                  </a:cubicBezTo>
+                  <a:close/>
+                </a:path>
+              </a:pathLst>
+            </a:custGeom>
+            <a:solidFill>
+              <a:srgbClr val="2ED47B"/>
+            </a:solidFill>
+          </p:spPr>
+        </p:sp>
+      </p:grpSp>
+      <p:grpSp>
+        <p:nvGrpSpPr>
+          <p:cNvPr name="Group 9" id="9"/>
+          <p:cNvGrpSpPr/>
+          <p:nvPr/>
+        </p:nvGrpSpPr>
+        <p:grpSpPr>
+          <a:xfrm rot="0">
             <a:off x="8098643" y="4304261"/>
             <a:ext cx="9160657" cy="1580841"/>
             <a:chOff x="0" y="0"/>
@@ -6498,7 +8003,7 @@
         </p:grpSpPr>
         <p:sp>
           <p:nvSpPr>
-            <p:cNvPr name="TextBox 7" id="7"/>
+            <p:cNvPr name="TextBox 10" id="10"/>
             <p:cNvSpPr txBox="true"/>
             <p:nvPr/>
           </p:nvSpPr>
@@ -6539,7 +8044,7 @@
         </p:sp>
         <p:sp>
           <p:nvSpPr>
-            <p:cNvPr name="TextBox 8" id="8"/>
+            <p:cNvPr name="TextBox 11" id="11"/>
             <p:cNvSpPr txBox="true"/>
             <p:nvPr/>
           </p:nvSpPr>
@@ -6581,21 +8086,21 @@
       </p:grpSp>
       <p:grpSp>
         <p:nvGrpSpPr>
-          <p:cNvPr name="Group 9" id="9"/>
+          <p:cNvPr name="Group 12" id="12"/>
           <p:cNvGrpSpPr/>
           <p:nvPr/>
         </p:nvGrpSpPr>
         <p:grpSpPr>
           <a:xfrm rot="0">
             <a:off x="8098643" y="6512378"/>
-            <a:ext cx="9160657" cy="1999941"/>
+            <a:ext cx="9160657" cy="2838141"/>
             <a:chOff x="0" y="0"/>
-            <a:chExt cx="12214209" cy="2666588"/>
+            <a:chExt cx="12214209" cy="3784188"/>
           </a:xfrm>
         </p:grpSpPr>
         <p:sp>
           <p:nvSpPr>
-            <p:cNvPr name="TextBox 10" id="10"/>
+            <p:cNvPr name="TextBox 13" id="13"/>
             <p:cNvSpPr txBox="true"/>
             <p:nvPr/>
           </p:nvSpPr>
@@ -6636,14 +8141,14 @@
         </p:sp>
         <p:sp>
           <p:nvSpPr>
-            <p:cNvPr name="TextBox 11" id="11"/>
+            <p:cNvPr name="TextBox 14" id="14"/>
             <p:cNvSpPr txBox="true"/>
             <p:nvPr/>
           </p:nvSpPr>
           <p:spPr>
             <a:xfrm rot="0">
               <a:off x="0" y="981650"/>
-              <a:ext cx="12214209" cy="1642745"/>
+              <a:ext cx="12214209" cy="2760345"/>
             </a:xfrm>
             <a:prstGeom prst="rect">
               <a:avLst/>
@@ -6690,7 +8195,7 @@
                   </a:solidFill>
                   <a:latin typeface="Inter"/>
                 </a:rPr>
-                <a:t>Добавить систему друзей, пополнить магазин</a:t>
+                <a:t>Добавить систему друзей, пополнить магазин, сделать внутриигровую почту, банк и вклады, аукционы... Много идей!</a:t>
               </a:r>
             </a:p>
           </p:txBody>
@@ -6698,7 +8203,7 @@
       </p:grpSp>
       <p:sp>
         <p:nvSpPr>
-          <p:cNvPr name="TextBox 12" id="12"/>
+          <p:cNvPr name="TextBox 15" id="15"/>
           <p:cNvSpPr txBox="true"/>
           <p:nvPr/>
         </p:nvSpPr>
@@ -6734,35 +8239,105 @@
                 </a:solidFill>
                 <a:latin typeface="Inter Bold"/>
               </a:rPr>
-              <a:t>04</a:t>
+              <a:t>05</a:t>
             </a:r>
           </a:p>
         </p:txBody>
       </p:sp>
+      <p:sp>
+        <p:nvSpPr>
+          <p:cNvPr name="TextBox 16" id="16"/>
+          <p:cNvSpPr txBox="true"/>
+          <p:nvPr/>
+        </p:nvSpPr>
+        <p:spPr>
+          <a:xfrm rot="0">
+            <a:off x="1028700" y="1133475"/>
+            <a:ext cx="14858905" cy="1038225"/>
+          </a:xfrm>
+          <a:prstGeom prst="rect">
+            <a:avLst/>
+          </a:prstGeom>
+        </p:spPr>
+        <p:txBody>
+          <a:bodyPr anchor="t" rtlCol="false" tIns="0" lIns="0" bIns="0" rIns="0">
+            <a:spAutoFit/>
+          </a:bodyPr>
+          <a:lstStyle/>
+          <a:p>
+            <a:pPr>
+              <a:lnSpc>
+                <a:spcPts val="7725"/>
+              </a:lnSpc>
+            </a:pPr>
+            <a:r>
+              <a:rPr lang="en-US" sz="7500">
+                <a:solidFill>
+                  <a:srgbClr val="0F1210"/>
+                </a:solidFill>
+                <a:latin typeface="Klein Black Bold"/>
+              </a:rPr>
+              <a:t>ЗАКЛЮЧЕНИЕ</a:t>
+            </a:r>
+          </a:p>
+        </p:txBody>
+      </p:sp>
+    </p:spTree>
+  </p:cSld>
+  <p:clrMapOvr>
+    <a:masterClrMapping/>
+  </p:clrMapOvr>
+</p:sld>
+</file>
+
+<file path=ppt/slides/slide6.xml><?xml version="1.0" encoding="utf-8"?>
+<p:sld xmlns:p="http://schemas.openxmlformats.org/presentationml/2006/main" xmlns:a="http://schemas.openxmlformats.org/drawingml/2006/main" xmlns:r="http://schemas.openxmlformats.org/officeDocument/2006/relationships">
+  <p:cSld>
+    <p:bg>
+      <p:bgPr>
+        <a:solidFill>
+          <a:srgbClr val="FAFAFA"/>
+        </a:solidFill>
+      </p:bgPr>
+    </p:bg>
+    <p:spTree>
+      <p:nvGrpSpPr>
+        <p:cNvPr id="1" name=""/>
+        <p:cNvGrpSpPr/>
+        <p:nvPr/>
+      </p:nvGrpSpPr>
+      <p:grpSpPr>
+        <a:xfrm>
+          <a:off x="0" y="0"/>
+          <a:ext cx="0" cy="0"/>
+          <a:chOff x="0" y="0"/>
+          <a:chExt cx="0" cy="0"/>
+        </a:xfrm>
+      </p:grpSpPr>
       <p:grpSp>
         <p:nvGrpSpPr>
-          <p:cNvPr name="Group 13" id="13"/>
+          <p:cNvPr name="Group 2" id="2"/>
           <p:cNvGrpSpPr/>
           <p:nvPr/>
         </p:nvGrpSpPr>
         <p:grpSpPr>
           <a:xfrm rot="0">
-            <a:off x="3927264" y="3045989"/>
-            <a:ext cx="2912577" cy="2839113"/>
+            <a:off x="1644396" y="4465546"/>
+            <a:ext cx="4565737" cy="4565737"/>
             <a:chOff x="0" y="0"/>
-            <a:chExt cx="4589780" cy="4578350"/>
+            <a:chExt cx="6350000" cy="6350000"/>
           </a:xfrm>
         </p:grpSpPr>
         <p:sp>
           <p:nvSpPr>
-            <p:cNvPr name="Freeform 14" id="14"/>
+            <p:cNvPr name="Freeform 3" id="3"/>
             <p:cNvSpPr/>
             <p:nvPr/>
           </p:nvSpPr>
           <p:spPr>
             <a:xfrm>
-              <a:off x="232345" y="209944"/>
-              <a:ext cx="2418937" cy="2345148"/>
+              <a:off x="14167" y="0"/>
+              <a:ext cx="6321665" cy="6350000"/>
             </a:xfrm>
             <a:custGeom>
               <a:avLst/>
@@ -6771,572 +8346,194 @@
               <a:cxnLst/>
               <a:rect r="r" b="b" t="t" l="l"/>
               <a:pathLst>
-                <a:path h="2345148" w="2418937">
-                  <a:moveTo>
-                    <a:pt x="20688" y="139962"/>
-                  </a:moveTo>
-                  <a:lnTo>
-                    <a:pt x="20688" y="116635"/>
-                  </a:lnTo>
-                  <a:cubicBezTo>
-                    <a:pt x="46947" y="116635"/>
-                    <a:pt x="68431" y="95641"/>
-                    <a:pt x="68431" y="69981"/>
-                  </a:cubicBezTo>
-                  <a:cubicBezTo>
-                    <a:pt x="68431" y="44321"/>
-                    <a:pt x="46947" y="23327"/>
-                    <a:pt x="20688" y="23327"/>
-                  </a:cubicBezTo>
-                  <a:lnTo>
-                    <a:pt x="20688" y="0"/>
-                  </a:lnTo>
-                  <a:cubicBezTo>
-                    <a:pt x="60474" y="0"/>
-                    <a:pt x="92302" y="31102"/>
-                    <a:pt x="92302" y="69981"/>
-                  </a:cubicBezTo>
-                  <a:cubicBezTo>
-                    <a:pt x="92302" y="108859"/>
-                    <a:pt x="60474" y="139962"/>
-                    <a:pt x="20688" y="139962"/>
-                  </a:cubicBezTo>
-                  <a:close/>
-                  <a:moveTo>
-                    <a:pt x="1273125" y="80867"/>
-                  </a:moveTo>
-                  <a:lnTo>
-                    <a:pt x="1273125" y="57540"/>
-                  </a:lnTo>
-                  <a:lnTo>
-                    <a:pt x="1129898" y="57540"/>
-                  </a:lnTo>
-                  <a:lnTo>
-                    <a:pt x="1129898" y="80867"/>
-                  </a:lnTo>
-                  <a:lnTo>
-                    <a:pt x="1273125" y="80867"/>
-                  </a:lnTo>
-                  <a:close/>
-                  <a:moveTo>
-                    <a:pt x="1201511" y="2345148"/>
-                  </a:moveTo>
-                  <a:cubicBezTo>
-                    <a:pt x="1241297" y="2345148"/>
-                    <a:pt x="1273125" y="2314045"/>
-                    <a:pt x="1273125" y="2275167"/>
-                  </a:cubicBezTo>
-                  <a:lnTo>
-                    <a:pt x="1249254" y="2275167"/>
-                  </a:lnTo>
-                  <a:cubicBezTo>
-                    <a:pt x="1249254" y="2300827"/>
-                    <a:pt x="1227770" y="2321821"/>
-                    <a:pt x="1201511" y="2321821"/>
-                  </a:cubicBezTo>
-                  <a:cubicBezTo>
-                    <a:pt x="1175253" y="2321821"/>
-                    <a:pt x="1153769" y="2300827"/>
-                    <a:pt x="1153769" y="2275167"/>
-                  </a:cubicBezTo>
-                  <a:lnTo>
-                    <a:pt x="1129898" y="2275167"/>
-                  </a:lnTo>
-                  <a:cubicBezTo>
-                    <a:pt x="1129898" y="2313268"/>
-                    <a:pt x="1161726" y="2345148"/>
-                    <a:pt x="1201511" y="2345148"/>
-                  </a:cubicBezTo>
-                  <a:close/>
-                  <a:moveTo>
-                    <a:pt x="592799" y="1748753"/>
-                  </a:moveTo>
-                  <a:cubicBezTo>
-                    <a:pt x="592799" y="1787631"/>
-                    <a:pt x="624627" y="1818734"/>
-                    <a:pt x="664412" y="1818734"/>
-                  </a:cubicBezTo>
-                  <a:lnTo>
-                    <a:pt x="664412" y="1795407"/>
-                  </a:lnTo>
-                  <a:cubicBezTo>
-                    <a:pt x="638154" y="1795407"/>
-                    <a:pt x="616670" y="1774412"/>
-                    <a:pt x="616670" y="1748753"/>
-                  </a:cubicBezTo>
-                  <a:cubicBezTo>
-                    <a:pt x="616670" y="1723093"/>
-                    <a:pt x="638154" y="1702098"/>
-                    <a:pt x="664412" y="1702098"/>
-                  </a:cubicBezTo>
-                  <a:lnTo>
-                    <a:pt x="664412" y="1678771"/>
-                  </a:lnTo>
-                  <a:cubicBezTo>
-                    <a:pt x="625423" y="1678771"/>
-                    <a:pt x="592799" y="1710652"/>
-                    <a:pt x="592799" y="1748753"/>
-                  </a:cubicBezTo>
-                  <a:close/>
-                  <a:moveTo>
-                    <a:pt x="101054" y="1245665"/>
-                  </a:moveTo>
-                  <a:lnTo>
-                    <a:pt x="117764" y="1228559"/>
-                  </a:lnTo>
-                  <a:lnTo>
-                    <a:pt x="16710" y="1129808"/>
-                  </a:lnTo>
-                  <a:lnTo>
-                    <a:pt x="0" y="1146137"/>
-                  </a:lnTo>
-                  <a:lnTo>
-                    <a:pt x="101054" y="1245665"/>
-                  </a:lnTo>
-                  <a:close/>
-                  <a:moveTo>
-                    <a:pt x="2418937" y="644604"/>
-                  </a:moveTo>
-                  <a:lnTo>
-                    <a:pt x="2418937" y="621277"/>
-                  </a:lnTo>
-                  <a:lnTo>
-                    <a:pt x="2275710" y="621277"/>
-                  </a:lnTo>
-                  <a:lnTo>
-                    <a:pt x="2275710" y="644604"/>
-                  </a:lnTo>
-                  <a:lnTo>
-                    <a:pt x="2418937" y="644604"/>
-                  </a:lnTo>
-                  <a:close/>
-                  <a:moveTo>
-                    <a:pt x="2311517" y="1192013"/>
-                  </a:moveTo>
-                  <a:cubicBezTo>
-                    <a:pt x="2311517" y="1230892"/>
-                    <a:pt x="2343345" y="1261994"/>
-                    <a:pt x="2383130" y="1261994"/>
-                  </a:cubicBezTo>
-                  <a:lnTo>
-                    <a:pt x="2383130" y="1238667"/>
-                  </a:lnTo>
-                  <a:cubicBezTo>
-                    <a:pt x="2356872" y="1238667"/>
-                    <a:pt x="2335388" y="1217673"/>
-                    <a:pt x="2335388" y="1192013"/>
-                  </a:cubicBezTo>
-                  <a:cubicBezTo>
-                    <a:pt x="2335388" y="1166353"/>
-                    <a:pt x="2356872" y="1145359"/>
-                    <a:pt x="2383130" y="1145359"/>
-                  </a:cubicBezTo>
-                  <a:lnTo>
-                    <a:pt x="2383130" y="1122032"/>
-                  </a:lnTo>
-                  <a:cubicBezTo>
-                    <a:pt x="2344141" y="1122032"/>
-                    <a:pt x="2311517" y="1153135"/>
-                    <a:pt x="2311517" y="1192013"/>
-                  </a:cubicBezTo>
-                  <a:close/>
-                  <a:moveTo>
-                    <a:pt x="1235727" y="630608"/>
-                  </a:moveTo>
-                  <a:cubicBezTo>
-                    <a:pt x="1235727" y="591730"/>
-                    <a:pt x="1203899" y="560627"/>
-                    <a:pt x="1164113" y="560627"/>
-                  </a:cubicBezTo>
-                  <a:lnTo>
-                    <a:pt x="1164113" y="583954"/>
-                  </a:lnTo>
-                  <a:cubicBezTo>
-                    <a:pt x="1190372" y="583954"/>
-                    <a:pt x="1211856" y="604948"/>
-                    <a:pt x="1211856" y="630608"/>
-                  </a:cubicBezTo>
-                  <a:cubicBezTo>
-                    <a:pt x="1211856" y="656268"/>
-                    <a:pt x="1190372" y="677262"/>
-                    <a:pt x="1164113" y="677262"/>
-                  </a:cubicBezTo>
-                  <a:lnTo>
-                    <a:pt x="1164113" y="700589"/>
-                  </a:lnTo>
-                  <a:cubicBezTo>
-                    <a:pt x="1203899" y="700589"/>
-                    <a:pt x="1235727" y="668709"/>
-                    <a:pt x="1235727" y="630608"/>
-                  </a:cubicBezTo>
-                  <a:close/>
-                  <a:moveTo>
-                    <a:pt x="639745" y="559072"/>
-                  </a:moveTo>
-                  <a:lnTo>
-                    <a:pt x="615874" y="559072"/>
-                  </a:lnTo>
-                  <a:lnTo>
-                    <a:pt x="615874" y="699034"/>
-                  </a:lnTo>
-                  <a:lnTo>
-                    <a:pt x="639745" y="699034"/>
-                  </a:lnTo>
-                  <a:lnTo>
-                    <a:pt x="639745" y="559072"/>
-                  </a:lnTo>
-                  <a:close/>
-                  <a:moveTo>
-                    <a:pt x="1272329" y="1201344"/>
-                  </a:moveTo>
-                  <a:lnTo>
-                    <a:pt x="1272329" y="1178017"/>
-                  </a:lnTo>
-                  <a:lnTo>
-                    <a:pt x="1129103" y="1178017"/>
-                  </a:lnTo>
-                  <a:lnTo>
-                    <a:pt x="1129103" y="1201344"/>
-                  </a:lnTo>
-                  <a:lnTo>
-                    <a:pt x="1272329" y="1201344"/>
-                  </a:lnTo>
-                  <a:close/>
-                  <a:moveTo>
-                    <a:pt x="2418937" y="2320266"/>
-                  </a:moveTo>
-                  <a:lnTo>
-                    <a:pt x="2418937" y="2296939"/>
-                  </a:lnTo>
-                  <a:lnTo>
-                    <a:pt x="2275710" y="2296939"/>
-                  </a:lnTo>
-                  <a:lnTo>
-                    <a:pt x="2275710" y="2320266"/>
-                  </a:lnTo>
-                  <a:lnTo>
-                    <a:pt x="2418937" y="2320266"/>
-                  </a:lnTo>
+                <a:path h="6350000" w="6321665">
+                  <a:moveTo>
+                    <a:pt x="3160833" y="0"/>
+                  </a:moveTo>
+                  <a:lnTo>
+                    <a:pt x="3160833" y="0"/>
+                  </a:lnTo>
+                  <a:cubicBezTo>
+                    <a:pt x="4908795" y="7817"/>
+                    <a:pt x="6321666" y="1427021"/>
+                    <a:pt x="6321666" y="3175000"/>
+                  </a:cubicBezTo>
+                  <a:cubicBezTo>
+                    <a:pt x="6321666" y="4922979"/>
+                    <a:pt x="4908795" y="6342183"/>
+                    <a:pt x="3160833" y="6350000"/>
+                  </a:cubicBezTo>
+                  <a:cubicBezTo>
+                    <a:pt x="1412871" y="6342183"/>
+                    <a:pt x="0" y="4922979"/>
+                    <a:pt x="0" y="3175000"/>
+                  </a:cubicBezTo>
+                  <a:cubicBezTo>
+                    <a:pt x="0" y="1427021"/>
+                    <a:pt x="1412871" y="7817"/>
+                    <a:pt x="3160833" y="0"/>
+                  </a:cubicBezTo>
                   <a:close/>
                 </a:path>
               </a:pathLst>
             </a:custGeom>
             <a:solidFill>
-              <a:srgbClr val="383838"/>
-            </a:solidFill>
-          </p:spPr>
-        </p:sp>
-        <p:sp>
-          <p:nvSpPr>
-            <p:cNvPr name="Freeform 15" id="15"/>
-            <p:cNvSpPr/>
-            <p:nvPr/>
-          </p:nvSpPr>
-          <p:spPr>
-            <a:xfrm>
-              <a:off x="214840" y="209944"/>
-              <a:ext cx="2423711" cy="2379361"/>
-            </a:xfrm>
-            <a:custGeom>
-              <a:avLst/>
-              <a:gdLst/>
-              <a:ahLst/>
-              <a:cxnLst/>
-              <a:rect r="r" b="b" t="t" l="l"/>
-              <a:pathLst>
-                <a:path h="2379361" w="2423711">
-                  <a:moveTo>
-                    <a:pt x="2376764" y="1820289"/>
-                  </a:moveTo>
-                  <a:lnTo>
-                    <a:pt x="2352893" y="1820289"/>
-                  </a:lnTo>
-                  <a:lnTo>
-                    <a:pt x="2352893" y="1680326"/>
-                  </a:lnTo>
-                  <a:lnTo>
-                    <a:pt x="2376764" y="1680326"/>
-                  </a:lnTo>
-                  <a:lnTo>
-                    <a:pt x="2376764" y="1820289"/>
-                  </a:lnTo>
-                  <a:close/>
-                  <a:moveTo>
-                    <a:pt x="657250" y="0"/>
-                  </a:moveTo>
-                  <a:lnTo>
-                    <a:pt x="633379" y="0"/>
-                  </a:lnTo>
-                  <a:lnTo>
-                    <a:pt x="633379" y="139962"/>
-                  </a:lnTo>
-                  <a:lnTo>
-                    <a:pt x="657250" y="139962"/>
-                  </a:lnTo>
-                  <a:lnTo>
-                    <a:pt x="657250" y="0"/>
-                  </a:lnTo>
-                  <a:close/>
-                  <a:moveTo>
-                    <a:pt x="33419" y="690481"/>
-                  </a:moveTo>
-                  <a:lnTo>
-                    <a:pt x="16710" y="674152"/>
-                  </a:lnTo>
-                  <a:lnTo>
-                    <a:pt x="117764" y="575401"/>
-                  </a:lnTo>
-                  <a:lnTo>
-                    <a:pt x="134474" y="591730"/>
-                  </a:lnTo>
-                  <a:lnTo>
-                    <a:pt x="33419" y="690481"/>
-                  </a:lnTo>
-                  <a:close/>
-                  <a:moveTo>
-                    <a:pt x="1729858" y="27992"/>
-                  </a:moveTo>
-                  <a:lnTo>
-                    <a:pt x="1746567" y="11663"/>
-                  </a:lnTo>
-                  <a:lnTo>
-                    <a:pt x="1847622" y="110414"/>
-                  </a:lnTo>
-                  <a:lnTo>
-                    <a:pt x="1830912" y="126743"/>
-                  </a:lnTo>
-                  <a:lnTo>
-                    <a:pt x="1729858" y="27992"/>
-                  </a:lnTo>
-                  <a:close/>
-                  <a:moveTo>
-                    <a:pt x="1863536" y="664821"/>
-                  </a:moveTo>
-                  <a:lnTo>
-                    <a:pt x="1839665" y="664821"/>
-                  </a:lnTo>
-                  <a:cubicBezTo>
-                    <a:pt x="1839665" y="639161"/>
-                    <a:pt x="1818181" y="618167"/>
-                    <a:pt x="1791923" y="618167"/>
-                  </a:cubicBezTo>
-                  <a:cubicBezTo>
-                    <a:pt x="1765664" y="618167"/>
-                    <a:pt x="1744180" y="639161"/>
-                    <a:pt x="1744180" y="664821"/>
-                  </a:cubicBezTo>
-                  <a:lnTo>
-                    <a:pt x="1720309" y="664821"/>
-                  </a:lnTo>
-                  <a:cubicBezTo>
-                    <a:pt x="1720309" y="625943"/>
-                    <a:pt x="1752137" y="594840"/>
-                    <a:pt x="1791923" y="594840"/>
-                  </a:cubicBezTo>
-                  <a:cubicBezTo>
-                    <a:pt x="1830912" y="594840"/>
-                    <a:pt x="1863536" y="626720"/>
-                    <a:pt x="1863536" y="664821"/>
-                  </a:cubicBezTo>
-                  <a:close/>
-                  <a:moveTo>
-                    <a:pt x="1180823" y="1812513"/>
-                  </a:moveTo>
-                  <a:lnTo>
-                    <a:pt x="1164113" y="1796184"/>
-                  </a:lnTo>
-                  <a:lnTo>
-                    <a:pt x="1265167" y="1697433"/>
-                  </a:lnTo>
-                  <a:lnTo>
-                    <a:pt x="1281877" y="1713762"/>
-                  </a:lnTo>
-                  <a:lnTo>
-                    <a:pt x="1180823" y="1812513"/>
-                  </a:lnTo>
-                  <a:close/>
-                  <a:moveTo>
-                    <a:pt x="82753" y="1819511"/>
-                  </a:moveTo>
-                  <a:lnTo>
-                    <a:pt x="58882" y="1819511"/>
-                  </a:lnTo>
-                  <a:lnTo>
-                    <a:pt x="58882" y="1679549"/>
-                  </a:lnTo>
-                  <a:lnTo>
-                    <a:pt x="82753" y="1679549"/>
-                  </a:lnTo>
-                  <a:lnTo>
-                    <a:pt x="82753" y="1819511"/>
-                  </a:lnTo>
-                  <a:close/>
-                  <a:moveTo>
-                    <a:pt x="1803062" y="2379361"/>
-                  </a:moveTo>
-                  <a:lnTo>
-                    <a:pt x="1779191" y="2379361"/>
-                  </a:lnTo>
-                  <a:lnTo>
-                    <a:pt x="1779191" y="2239399"/>
-                  </a:lnTo>
-                  <a:lnTo>
-                    <a:pt x="1803062" y="2239399"/>
-                  </a:lnTo>
-                  <a:lnTo>
-                    <a:pt x="1803062" y="2379361"/>
-                  </a:lnTo>
-                  <a:close/>
-                  <a:moveTo>
-                    <a:pt x="143226" y="2344370"/>
-                  </a:moveTo>
-                  <a:lnTo>
-                    <a:pt x="119355" y="2344370"/>
-                  </a:lnTo>
-                  <a:cubicBezTo>
-                    <a:pt x="119355" y="2318711"/>
-                    <a:pt x="97871" y="2297716"/>
-                    <a:pt x="71613" y="2297716"/>
-                  </a:cubicBezTo>
-                  <a:cubicBezTo>
-                    <a:pt x="45355" y="2297716"/>
-                    <a:pt x="23871" y="2318711"/>
-                    <a:pt x="23871" y="2344370"/>
-                  </a:cubicBezTo>
-                  <a:lnTo>
-                    <a:pt x="0" y="2344370"/>
-                  </a:lnTo>
-                  <a:cubicBezTo>
-                    <a:pt x="0" y="2305492"/>
-                    <a:pt x="31828" y="2274389"/>
-                    <a:pt x="71613" y="2274389"/>
-                  </a:cubicBezTo>
-                  <a:cubicBezTo>
-                    <a:pt x="111398" y="2274389"/>
-                    <a:pt x="143226" y="2305492"/>
-                    <a:pt x="143226" y="2344370"/>
-                  </a:cubicBezTo>
-                  <a:close/>
-                  <a:moveTo>
-                    <a:pt x="2322656" y="127521"/>
-                  </a:moveTo>
-                  <a:lnTo>
-                    <a:pt x="2305946" y="111192"/>
-                  </a:lnTo>
-                  <a:lnTo>
-                    <a:pt x="2407001" y="12441"/>
-                  </a:lnTo>
-                  <a:lnTo>
-                    <a:pt x="2423710" y="28770"/>
-                  </a:lnTo>
-                  <a:lnTo>
-                    <a:pt x="2322656" y="127521"/>
-                  </a:lnTo>
-                  <a:close/>
-                  <a:moveTo>
-                    <a:pt x="601551" y="2370030"/>
-                  </a:moveTo>
-                  <a:lnTo>
-                    <a:pt x="584841" y="2353701"/>
-                  </a:lnTo>
-                  <a:lnTo>
-                    <a:pt x="685896" y="2254950"/>
-                  </a:lnTo>
-                  <a:lnTo>
-                    <a:pt x="702605" y="2271279"/>
-                  </a:lnTo>
-                  <a:lnTo>
-                    <a:pt x="601551" y="2370030"/>
-                  </a:lnTo>
-                  <a:close/>
-                  <a:moveTo>
-                    <a:pt x="1746567" y="1249553"/>
-                  </a:moveTo>
-                  <a:lnTo>
-                    <a:pt x="1729858" y="1233224"/>
-                  </a:lnTo>
-                  <a:lnTo>
-                    <a:pt x="1830912" y="1134473"/>
-                  </a:lnTo>
-                  <a:lnTo>
-                    <a:pt x="1847622" y="1150802"/>
-                  </a:lnTo>
-                  <a:lnTo>
-                    <a:pt x="1746567" y="1249553"/>
-                  </a:lnTo>
-                  <a:close/>
-                  <a:moveTo>
-                    <a:pt x="573701" y="1154690"/>
-                  </a:moveTo>
-                  <a:lnTo>
-                    <a:pt x="597573" y="1154690"/>
-                  </a:lnTo>
-                  <a:cubicBezTo>
-                    <a:pt x="597573" y="1180350"/>
-                    <a:pt x="619056" y="1201344"/>
-                    <a:pt x="645315" y="1201344"/>
-                  </a:cubicBezTo>
-                  <a:cubicBezTo>
-                    <a:pt x="671573" y="1201344"/>
-                    <a:pt x="693057" y="1180350"/>
-                    <a:pt x="693057" y="1154690"/>
-                  </a:cubicBezTo>
-                  <a:lnTo>
-                    <a:pt x="716928" y="1154690"/>
-                  </a:lnTo>
-                  <a:cubicBezTo>
-                    <a:pt x="716928" y="1193568"/>
-                    <a:pt x="685100" y="1224671"/>
-                    <a:pt x="645315" y="1224671"/>
-                  </a:cubicBezTo>
-                  <a:cubicBezTo>
-                    <a:pt x="606325" y="1224671"/>
-                    <a:pt x="573701" y="1193568"/>
-                    <a:pt x="573701" y="1154690"/>
-                  </a:cubicBezTo>
-                  <a:close/>
-                  <a:moveTo>
-                    <a:pt x="1863536" y="1783743"/>
-                  </a:moveTo>
-                  <a:lnTo>
-                    <a:pt x="1839665" y="1783743"/>
-                  </a:lnTo>
-                  <a:cubicBezTo>
-                    <a:pt x="1839665" y="1758083"/>
-                    <a:pt x="1818181" y="1737089"/>
-                    <a:pt x="1791923" y="1737089"/>
-                  </a:cubicBezTo>
-                  <a:cubicBezTo>
-                    <a:pt x="1765664" y="1737089"/>
-                    <a:pt x="1744180" y="1758083"/>
-                    <a:pt x="1744180" y="1783743"/>
-                  </a:cubicBezTo>
-                  <a:lnTo>
-                    <a:pt x="1720309" y="1783743"/>
-                  </a:lnTo>
-                  <a:cubicBezTo>
-                    <a:pt x="1720309" y="1744865"/>
-                    <a:pt x="1752137" y="1713762"/>
-                    <a:pt x="1791923" y="1713762"/>
-                  </a:cubicBezTo>
-                  <a:cubicBezTo>
-                    <a:pt x="1831708" y="1713762"/>
-                    <a:pt x="1863536" y="1745642"/>
-                    <a:pt x="1863536" y="1783743"/>
-                  </a:cubicBezTo>
-                  <a:close/>
-                </a:path>
-              </a:pathLst>
-            </a:custGeom>
-            <a:solidFill>
-              <a:srgbClr val="2ED47B"/>
+              <a:srgbClr val="242725">
+                <a:alpha val="4706"/>
+              </a:srgbClr>
             </a:solidFill>
           </p:spPr>
         </p:sp>
       </p:grpSp>
+      <p:pic>
+        <p:nvPicPr>
+          <p:cNvPr name="Picture 4" id="4"/>
+          <p:cNvPicPr>
+            <a:picLocks noChangeAspect="true"/>
+          </p:cNvPicPr>
+          <p:nvPr/>
+        </p:nvPicPr>
+        <p:blipFill>
+          <a:blip r:embed="rId2">
+            <a:extLst>
+              <a:ext uri="{28A0092B-C50C-407E-A947-70E740481C1C}">
+                <a14:useLocalDpi xmlns:a14="http://schemas.microsoft.com/office/drawing/2010/main" val="0"/>
+              </a:ext>
+              <a:ext uri="{96DAC541-7B7A-43D3-8B79-37D633B846F1}">
+                <asvg:svgBlip xmlns:asvg="http://schemas.microsoft.com/office/drawing/2016/SVG/main" r:embed="rId3"/>
+              </a:ext>
+            </a:extLst>
+          </a:blip>
+          <a:srcRect l="0" t="0" r="0" b="0"/>
+          <a:stretch>
+            <a:fillRect/>
+          </a:stretch>
+        </p:blipFill>
+        <p:spPr>
+          <a:xfrm flipH="false" flipV="false" rot="0">
+            <a:off x="354455" y="4569771"/>
+            <a:ext cx="6281547" cy="5150869"/>
+          </a:xfrm>
+          <a:prstGeom prst="rect">
+            <a:avLst/>
+          </a:prstGeom>
+        </p:spPr>
+      </p:pic>
       <p:sp>
         <p:nvSpPr>
-          <p:cNvPr name="TextBox 16" id="16"/>
+          <p:cNvPr name="AutoShape 5" id="5"/>
+          <p:cNvSpPr/>
+          <p:nvPr/>
+        </p:nvSpPr>
+        <p:spPr>
+          <a:xfrm rot="0">
+            <a:off x="-443075" y="9720640"/>
+            <a:ext cx="18865925" cy="566360"/>
+          </a:xfrm>
+          <a:prstGeom prst="rect">
+            <a:avLst/>
+          </a:prstGeom>
+          <a:solidFill>
+            <a:srgbClr val="2ED47B"/>
+          </a:solidFill>
+        </p:spPr>
+      </p:sp>
+      <p:pic>
+        <p:nvPicPr>
+          <p:cNvPr name="Picture 6" id="6"/>
+          <p:cNvPicPr>
+            <a:picLocks noChangeAspect="true"/>
+          </p:cNvPicPr>
+          <p:nvPr/>
+        </p:nvPicPr>
+        <p:blipFill>
+          <a:blip r:embed="rId4"/>
+          <a:srcRect l="0" t="0" r="0" b="0"/>
+          <a:stretch>
+            <a:fillRect/>
+          </a:stretch>
+        </p:blipFill>
+        <p:spPr>
+          <a:xfrm flipH="false" flipV="false" rot="0">
+            <a:off x="6210133" y="2171700"/>
+            <a:ext cx="6093790" cy="3580300"/>
+          </a:xfrm>
+          <a:prstGeom prst="rect">
+            <a:avLst/>
+          </a:prstGeom>
+        </p:spPr>
+      </p:pic>
+      <p:pic>
+        <p:nvPicPr>
+          <p:cNvPr name="Picture 7" id="7"/>
+          <p:cNvPicPr>
+            <a:picLocks noChangeAspect="true"/>
+          </p:cNvPicPr>
+          <p:nvPr/>
+        </p:nvPicPr>
+        <p:blipFill>
+          <a:blip r:embed="rId5"/>
+          <a:srcRect l="0" t="0" r="0" b="0"/>
+          <a:stretch>
+            <a:fillRect/>
+          </a:stretch>
+        </p:blipFill>
+        <p:spPr>
+          <a:xfrm flipH="false" flipV="false" rot="0">
+            <a:off x="10368062" y="5614611"/>
+            <a:ext cx="6192017" cy="3643689"/>
+          </a:xfrm>
+          <a:prstGeom prst="rect">
+            <a:avLst/>
+          </a:prstGeom>
+        </p:spPr>
+      </p:pic>
+      <p:sp>
+        <p:nvSpPr>
+          <p:cNvPr name="TextBox 8" id="8"/>
+          <p:cNvSpPr txBox="true"/>
+          <p:nvPr/>
+        </p:nvSpPr>
+        <p:spPr>
+          <a:xfrm rot="0">
+            <a:off x="14069725" y="351431"/>
+            <a:ext cx="3189575" cy="2803731"/>
+          </a:xfrm>
+          <a:prstGeom prst="rect">
+            <a:avLst/>
+          </a:prstGeom>
+        </p:spPr>
+        <p:txBody>
+          <a:bodyPr anchor="t" rtlCol="false" tIns="0" lIns="0" bIns="0" rIns="0">
+            <a:spAutoFit/>
+          </a:bodyPr>
+          <a:lstStyle/>
+          <a:p>
+            <a:pPr algn="r">
+              <a:lnSpc>
+                <a:spcPts val="22925"/>
+              </a:lnSpc>
+              <a:spcBef>
+                <a:spcPct val="0"/>
+              </a:spcBef>
+            </a:pPr>
+            <a:r>
+              <a:rPr lang="en-US" sz="16375">
+                <a:solidFill>
+                  <a:srgbClr val="242725">
+                    <a:alpha val="7843"/>
+                  </a:srgbClr>
+                </a:solidFill>
+                <a:latin typeface="Inter Bold"/>
+              </a:rPr>
+              <a:t>06</a:t>
+            </a:r>
+          </a:p>
+        </p:txBody>
+      </p:sp>
+      <p:sp>
+        <p:nvSpPr>
+          <p:cNvPr name="TextBox 9" id="9"/>
           <p:cNvSpPr txBox="true"/>
           <p:nvPr/>
         </p:nvSpPr>

</xml_diff>